<commit_message>
still struggling with post-receive
</commit_message>
<xml_diff>
--- a/Slides/Lesson 3.1 Introduction to Universe Programs.pptx
+++ b/Slides/Lesson 3.1 Introduction to Universe Programs.pptx
@@ -10,7 +10,7 @@
   <p:sldIdLst>
     <p:sldId id="257" r:id="rId2"/>
     <p:sldId id="320" r:id="rId3"/>
-    <p:sldId id="322" r:id="rId4"/>
+    <p:sldId id="326" r:id="rId4"/>
     <p:sldId id="323" r:id="rId5"/>
     <p:sldId id="306" r:id="rId6"/>
     <p:sldId id="265" r:id="rId7"/>
@@ -153,7 +153,7 @@
   </p:defaultTextStyle>
   <p:extLst>
     <p:ext uri="{EFAFB233-063F-42B5-8137-9DF3F51BA10A}">
-      <p15:sldGuideLst xmlns:p15="http://schemas.microsoft.com/office/powerpoint/2012/main" xmlns="">
+      <p15:sldGuideLst xmlns:p15="http://schemas.microsoft.com/office/powerpoint/2012/main">
         <p15:guide id="1" orient="horz" pos="2160">
           <p15:clr>
             <a:srgbClr val="A4A3A4"/>
@@ -259,7 +259,7 @@
             <a:fld id="{CF8F25F6-E1EF-4065-8525-42EDEBD9BD22}" type="datetimeFigureOut">
               <a:rPr lang="en-US" smtClean="0"/>
               <a:pPr/>
-              <a:t>9/9/2014</a:t>
+              <a:t>8/18/2015</a:t>
             </a:fld>
             <a:endParaRPr lang="en-US"/>
           </a:p>
@@ -1263,7 +1263,7 @@
             <a:fld id="{CBE6DF32-C57F-4EA4-9518-EB5F320F182D}" type="datetimeFigureOut">
               <a:rPr lang="en-US" smtClean="0"/>
               <a:pPr/>
-              <a:t>9/9/2014</a:t>
+              <a:t>8/18/2015</a:t>
             </a:fld>
             <a:endParaRPr lang="en-US"/>
           </a:p>
@@ -1544,7 +1544,7 @@
             <a:fld id="{CBE6DF32-C57F-4EA4-9518-EB5F320F182D}" type="datetimeFigureOut">
               <a:rPr lang="en-US" smtClean="0"/>
               <a:pPr/>
-              <a:t>9/9/2014</a:t>
+              <a:t>8/18/2015</a:t>
             </a:fld>
             <a:endParaRPr lang="en-US"/>
           </a:p>
@@ -1794,7 +1794,7 @@
             <a:fld id="{CBE6DF32-C57F-4EA4-9518-EB5F320F182D}" type="datetimeFigureOut">
               <a:rPr lang="en-US" smtClean="0"/>
               <a:pPr/>
-              <a:t>9/9/2014</a:t>
+              <a:t>8/18/2015</a:t>
             </a:fld>
             <a:endParaRPr lang="en-US"/>
           </a:p>
@@ -1961,7 +1961,7 @@
             <a:fld id="{CBE6DF32-C57F-4EA4-9518-EB5F320F182D}" type="datetimeFigureOut">
               <a:rPr lang="en-US" smtClean="0"/>
               <a:pPr/>
-              <a:t>9/9/2014</a:t>
+              <a:t>8/18/2015</a:t>
             </a:fld>
             <a:endParaRPr lang="en-US"/>
           </a:p>
@@ -2138,7 +2138,7 @@
             <a:fld id="{CBE6DF32-C57F-4EA4-9518-EB5F320F182D}" type="datetimeFigureOut">
               <a:rPr lang="en-US" smtClean="0"/>
               <a:pPr/>
-              <a:t>9/9/2014</a:t>
+              <a:t>8/18/2015</a:t>
             </a:fld>
             <a:endParaRPr lang="en-US"/>
           </a:p>
@@ -2312,7 +2312,7 @@
             <a:fld id="{CBE6DF32-C57F-4EA4-9518-EB5F320F182D}" type="datetimeFigureOut">
               <a:rPr lang="en-US" smtClean="0"/>
               <a:pPr/>
-              <a:t>9/9/2014</a:t>
+              <a:t>8/18/2015</a:t>
             </a:fld>
             <a:endParaRPr lang="en-US"/>
           </a:p>
@@ -2493,7 +2493,7 @@
           <a:p>
             <a:fld id="{2A227105-D2B9-4910-8FAF-23A09D7D404E}" type="datetimeFigureOut">
               <a:rPr lang="en-US" smtClean="0"/>
-              <a:t>9/9/2014</a:t>
+              <a:t>8/18/2015</a:t>
             </a:fld>
             <a:endParaRPr lang="en-US"/>
           </a:p>
@@ -2675,7 +2675,7 @@
           <a:p>
             <a:fld id="{E22ED4DA-448D-4BB1-B935-CC112220207B}" type="datetime1">
               <a:rPr lang="en-US" smtClean="0"/>
-              <a:t>9/9/2014</a:t>
+              <a:t>8/18/2015</a:t>
             </a:fld>
             <a:endParaRPr lang="en-US"/>
           </a:p>
@@ -3013,7 +3013,7 @@
             <a:fld id="{CBE6DF32-C57F-4EA4-9518-EB5F320F182D}" type="datetimeFigureOut">
               <a:rPr lang="en-US" smtClean="0"/>
               <a:pPr/>
-              <a:t>9/9/2014</a:t>
+              <a:t>8/18/2015</a:t>
             </a:fld>
             <a:endParaRPr lang="en-US"/>
           </a:p>
@@ -3305,7 +3305,7 @@
             <a:fld id="{CBE6DF32-C57F-4EA4-9518-EB5F320F182D}" type="datetimeFigureOut">
               <a:rPr lang="en-US" smtClean="0"/>
               <a:pPr/>
-              <a:t>9/9/2014</a:t>
+              <a:t>8/18/2015</a:t>
             </a:fld>
             <a:endParaRPr lang="en-US"/>
           </a:p>
@@ -3724,7 +3724,7 @@
             <a:fld id="{CBE6DF32-C57F-4EA4-9518-EB5F320F182D}" type="datetimeFigureOut">
               <a:rPr lang="en-US" smtClean="0"/>
               <a:pPr/>
-              <a:t>9/9/2014</a:t>
+              <a:t>8/18/2015</a:t>
             </a:fld>
             <a:endParaRPr lang="en-US"/>
           </a:p>
@@ -3839,7 +3839,7 @@
             <a:fld id="{CBE6DF32-C57F-4EA4-9518-EB5F320F182D}" type="datetimeFigureOut">
               <a:rPr lang="en-US" smtClean="0"/>
               <a:pPr/>
-              <a:t>9/9/2014</a:t>
+              <a:t>8/18/2015</a:t>
             </a:fld>
             <a:endParaRPr lang="en-US"/>
           </a:p>
@@ -3938,7 +3938,7 @@
             <a:fld id="{CBE6DF32-C57F-4EA4-9518-EB5F320F182D}" type="datetimeFigureOut">
               <a:rPr lang="en-US" smtClean="0"/>
               <a:pPr/>
-              <a:t>9/9/2014</a:t>
+              <a:t>8/18/2015</a:t>
             </a:fld>
             <a:endParaRPr lang="en-US"/>
           </a:p>
@@ -4148,7 +4148,7 @@
             <a:fld id="{CBE6DF32-C57F-4EA4-9518-EB5F320F182D}" type="datetimeFigureOut">
               <a:rPr lang="en-US" smtClean="0"/>
               <a:pPr/>
-              <a:t>9/9/2014</a:t>
+              <a:t>8/18/2015</a:t>
             </a:fld>
             <a:endParaRPr lang="en-US"/>
           </a:p>
@@ -4747,8 +4747,9 @@
               </a:r>
               <a:r>
                 <a:rPr lang="en-US" sz="1000" dirty="0" smtClean="0"/>
-                <a:t>2012-2014</a:t>
+                <a:t>2012-2015</a:t>
               </a:r>
+              <a:endParaRPr lang="en-US" sz="1000" dirty="0" smtClean="0"/>
             </a:p>
             <a:p>
               <a:r>
@@ -7039,7 +7040,7 @@
         <p:spPr/>
         <p:txBody>
           <a:bodyPr>
-            <a:normAutofit/>
+            <a:normAutofit fontScale="92500"/>
           </a:bodyPr>
           <a:lstStyle/>
           <a:p>
@@ -7052,8 +7053,13 @@
             </a:r>
             <a:r>
               <a:rPr lang="en-US" dirty="0" smtClean="0"/>
-              <a:t> is compound, so use structural decomposition:</a:t>
-            </a:r>
+              <a:t> is compound, so use </a:t>
+            </a:r>
+            <a:r>
+              <a:rPr lang="en-US" dirty="0" smtClean="0"/>
+              <a:t>the template for World</a:t>
+            </a:r>
+            <a:endParaRPr lang="en-US" dirty="0" smtClean="0"/>
           </a:p>
           <a:p>
             <a:pPr>
@@ -7064,8 +7070,19 @@
                 <a:latin typeface="Consolas" pitchFamily="49" charset="0"/>
                 <a:cs typeface="Consolas" pitchFamily="49" charset="0"/>
               </a:rPr>
-              <a:t>;; strategy: structural decomposition [World]</a:t>
-            </a:r>
+              <a:t>;; strategy: </a:t>
+            </a:r>
+            <a:r>
+              <a:rPr lang="en-US" sz="2400" b="1" dirty="0" smtClean="0">
+                <a:latin typeface="Consolas" pitchFamily="49" charset="0"/>
+                <a:cs typeface="Consolas" pitchFamily="49" charset="0"/>
+              </a:rPr>
+              <a:t>use template for World on w</a:t>
+            </a:r>
+            <a:endParaRPr lang="en-US" sz="2400" b="1" dirty="0" smtClean="0">
+              <a:latin typeface="Consolas" pitchFamily="49" charset="0"/>
+              <a:cs typeface="Consolas" pitchFamily="49" charset="0"/>
+            </a:endParaRPr>
           </a:p>
           <a:p>
             <a:pPr>
@@ -7143,7 +7160,7 @@
               <a:rPr lang="en-US" dirty="0" smtClean="0">
                 <a:cs typeface="Courier New" pitchFamily="49" charset="0"/>
               </a:rPr>
-              <a:t>It’s complicated, so we'll make it a separate function</a:t>
+              <a:t>If the world is paused, we should return w unchanged.  Otherwise, we should return a world in which the cat has fallen CATSPEED pixels.</a:t>
             </a:r>
             <a:endParaRPr lang="en-US" dirty="0">
               <a:cs typeface="Courier New" pitchFamily="49" charset="0"/>
@@ -7200,7 +7217,7 @@
           <a:p>
             <a:r>
               <a:rPr lang="en-US" dirty="0" smtClean="0"/>
-              <a:t>Helper function</a:t>
+              <a:t>Function Definition</a:t>
             </a:r>
             <a:endParaRPr lang="en-US" dirty="0"/>
           </a:p>
@@ -7231,152 +7248,8 @@
                 <a:latin typeface="Consolas" pitchFamily="49" charset="0"/>
                 <a:cs typeface="Consolas" pitchFamily="49" charset="0"/>
               </a:rPr>
-              <a:t>;; world-after-tick-helper : </a:t>
-            </a:r>
-            <a:r>
-              <a:rPr lang="en-US" sz="2000" b="1" dirty="0" smtClean="0">
-                <a:latin typeface="Consolas" pitchFamily="49" charset="0"/>
-                <a:cs typeface="Consolas" pitchFamily="49" charset="0"/>
-              </a:rPr>
-              <a:t>Integer </a:t>
-            </a:r>
-            <a:r>
-              <a:rPr lang="en-US" sz="2000" b="1" dirty="0">
-                <a:latin typeface="Consolas" pitchFamily="49" charset="0"/>
-                <a:cs typeface="Consolas" pitchFamily="49" charset="0"/>
-              </a:rPr>
-              <a:t>Boolean -&gt; World</a:t>
-            </a:r>
-          </a:p>
-          <a:p>
-            <a:pPr>
-              <a:buNone/>
-            </a:pPr>
-            <a:r>
-              <a:rPr lang="en-US" sz="2000" b="1" dirty="0">
-                <a:latin typeface="Consolas" pitchFamily="49" charset="0"/>
-                <a:cs typeface="Consolas" pitchFamily="49" charset="0"/>
-              </a:rPr>
-              <a:t>;; GIVEN the position of the cat and paused?</a:t>
-            </a:r>
-          </a:p>
-          <a:p>
-            <a:pPr>
-              <a:buNone/>
-            </a:pPr>
-            <a:r>
-              <a:rPr lang="en-US" sz="2000" b="1" dirty="0">
-                <a:latin typeface="Consolas" pitchFamily="49" charset="0"/>
-                <a:cs typeface="Consolas" pitchFamily="49" charset="0"/>
-              </a:rPr>
-              <a:t>;; RETURNS: the next World</a:t>
-            </a:r>
-          </a:p>
-          <a:p>
-            <a:pPr>
-              <a:buNone/>
-            </a:pPr>
-            <a:r>
-              <a:rPr lang="en-US" sz="2000" b="1" dirty="0">
-                <a:latin typeface="Consolas" pitchFamily="49" charset="0"/>
-                <a:cs typeface="Consolas" pitchFamily="49" charset="0"/>
-              </a:rPr>
-              <a:t>;; STRATEGY: function composition</a:t>
-            </a:r>
-          </a:p>
-          <a:p>
-            <a:pPr>
-              <a:buNone/>
-            </a:pPr>
-            <a:r>
-              <a:rPr lang="en-US" sz="2000" b="1" dirty="0">
-                <a:latin typeface="Consolas" pitchFamily="49" charset="0"/>
-                <a:cs typeface="Consolas" pitchFamily="49" charset="0"/>
-              </a:rPr>
-              <a:t>(define (world-after-tick-helper </a:t>
-            </a:r>
-            <a:r>
-              <a:rPr lang="en-US" sz="2000" b="1" dirty="0" err="1">
-                <a:latin typeface="Consolas" pitchFamily="49" charset="0"/>
-                <a:cs typeface="Consolas" pitchFamily="49" charset="0"/>
-              </a:rPr>
-              <a:t>pos</a:t>
-            </a:r>
-            <a:r>
-              <a:rPr lang="en-US" sz="2000" b="1" dirty="0">
-                <a:latin typeface="Consolas" pitchFamily="49" charset="0"/>
-                <a:cs typeface="Consolas" pitchFamily="49" charset="0"/>
-              </a:rPr>
-              <a:t> paused?)</a:t>
-            </a:r>
-          </a:p>
-          <a:p>
-            <a:pPr>
-              <a:buNone/>
-            </a:pPr>
-            <a:r>
-              <a:rPr lang="en-US" sz="2000" b="1" dirty="0">
-                <a:latin typeface="Consolas" pitchFamily="49" charset="0"/>
-                <a:cs typeface="Consolas" pitchFamily="49" charset="0"/>
-              </a:rPr>
-              <a:t>  (if paused? </a:t>
-            </a:r>
-          </a:p>
-          <a:p>
-            <a:pPr>
-              <a:buNone/>
-            </a:pPr>
-            <a:r>
-              <a:rPr lang="en-US" sz="2000" b="1" dirty="0">
-                <a:latin typeface="Consolas" pitchFamily="49" charset="0"/>
-                <a:cs typeface="Consolas" pitchFamily="49" charset="0"/>
-              </a:rPr>
-              <a:t>      (make-world </a:t>
-            </a:r>
-            <a:r>
-              <a:rPr lang="en-US" sz="2000" b="1" dirty="0" err="1">
-                <a:latin typeface="Consolas" pitchFamily="49" charset="0"/>
-                <a:cs typeface="Consolas" pitchFamily="49" charset="0"/>
-              </a:rPr>
-              <a:t>pos</a:t>
-            </a:r>
-            <a:r>
-              <a:rPr lang="en-US" sz="2000" b="1" dirty="0">
-                <a:latin typeface="Consolas" pitchFamily="49" charset="0"/>
-                <a:cs typeface="Consolas" pitchFamily="49" charset="0"/>
-              </a:rPr>
-              <a:t> paused?)</a:t>
-            </a:r>
-          </a:p>
-          <a:p>
-            <a:pPr>
-              <a:buNone/>
-            </a:pPr>
-            <a:r>
-              <a:rPr lang="en-US" sz="2000" b="1" dirty="0">
-                <a:latin typeface="Consolas" pitchFamily="49" charset="0"/>
-                <a:cs typeface="Consolas" pitchFamily="49" charset="0"/>
-              </a:rPr>
-              <a:t>      (make-world (+ </a:t>
-            </a:r>
-            <a:r>
-              <a:rPr lang="en-US" sz="2000" b="1" dirty="0" err="1">
-                <a:latin typeface="Consolas" pitchFamily="49" charset="0"/>
-                <a:cs typeface="Consolas" pitchFamily="49" charset="0"/>
-              </a:rPr>
-              <a:t>pos</a:t>
-            </a:r>
-            <a:r>
-              <a:rPr lang="en-US" sz="2000" b="1" dirty="0">
-                <a:latin typeface="Consolas" pitchFamily="49" charset="0"/>
-                <a:cs typeface="Consolas" pitchFamily="49" charset="0"/>
-              </a:rPr>
-              <a:t> CATSPEED) paused?))) </a:t>
-            </a:r>
-            <a:endParaRPr lang="en-US" sz="2000" b="1" dirty="0" smtClean="0">
-              <a:latin typeface="Consolas" pitchFamily="49" charset="0"/>
-              <a:cs typeface="Consolas" pitchFamily="49" charset="0"/>
-            </a:endParaRPr>
+              <a:t>;; STRATEGY: Use template for World on w</a:t>
+            </a:r>
           </a:p>
           <a:p>
             <a:pPr>
@@ -7392,11 +7265,78 @@
               <a:buNone/>
             </a:pPr>
             <a:r>
-              <a:rPr lang="en-US" sz="2400" dirty="0" smtClean="0">
-                <a:cs typeface="Courier New" pitchFamily="49" charset="0"/>
-              </a:rPr>
-              <a:t>Don’t need separate tests for helper functions except for debugging.</a:t>
-            </a:r>
+              <a:rPr lang="en-US" sz="2000" b="1" dirty="0">
+                <a:latin typeface="Consolas" pitchFamily="49" charset="0"/>
+                <a:cs typeface="Consolas" pitchFamily="49" charset="0"/>
+              </a:rPr>
+              <a:t>(define (world-after-tick w)</a:t>
+            </a:r>
+          </a:p>
+          <a:p>
+            <a:pPr>
+              <a:buNone/>
+            </a:pPr>
+            <a:r>
+              <a:rPr lang="en-US" sz="2000" b="1" dirty="0">
+                <a:latin typeface="Consolas" pitchFamily="49" charset="0"/>
+                <a:cs typeface="Consolas" pitchFamily="49" charset="0"/>
+              </a:rPr>
+              <a:t>  (if (world-paused? w)</a:t>
+            </a:r>
+          </a:p>
+          <a:p>
+            <a:pPr>
+              <a:buNone/>
+            </a:pPr>
+            <a:r>
+              <a:rPr lang="en-US" sz="2000" b="1" dirty="0">
+                <a:latin typeface="Consolas" pitchFamily="49" charset="0"/>
+                <a:cs typeface="Consolas" pitchFamily="49" charset="0"/>
+              </a:rPr>
+              <a:t>      w</a:t>
+            </a:r>
+          </a:p>
+          <a:p>
+            <a:pPr>
+              <a:buNone/>
+            </a:pPr>
+            <a:r>
+              <a:rPr lang="en-US" sz="2000" b="1" dirty="0">
+                <a:latin typeface="Consolas" pitchFamily="49" charset="0"/>
+                <a:cs typeface="Consolas" pitchFamily="49" charset="0"/>
+              </a:rPr>
+              <a:t>      (make-world (+ (world-</a:t>
+            </a:r>
+            <a:r>
+              <a:rPr lang="en-US" sz="2000" b="1" dirty="0" err="1">
+                <a:latin typeface="Consolas" pitchFamily="49" charset="0"/>
+                <a:cs typeface="Consolas" pitchFamily="49" charset="0"/>
+              </a:rPr>
+              <a:t>pos</a:t>
+            </a:r>
+            <a:r>
+              <a:rPr lang="en-US" sz="2000" b="1" dirty="0">
+                <a:latin typeface="Consolas" pitchFamily="49" charset="0"/>
+                <a:cs typeface="Consolas" pitchFamily="49" charset="0"/>
+              </a:rPr>
+              <a:t> w) CATSPEED)</a:t>
+            </a:r>
+          </a:p>
+          <a:p>
+            <a:pPr>
+              <a:buNone/>
+            </a:pPr>
+            <a:r>
+              <a:rPr lang="en-US" sz="2000" b="1" dirty="0">
+                <a:latin typeface="Consolas" pitchFamily="49" charset="0"/>
+                <a:cs typeface="Consolas" pitchFamily="49" charset="0"/>
+              </a:rPr>
+              <a:t>                  (world-paused? w))))</a:t>
+            </a:r>
+            <a:endParaRPr lang="en-US" sz="2000" b="1" dirty="0">
+              <a:latin typeface="Consolas" pitchFamily="49" charset="0"/>
+              <a:cs typeface="Consolas" pitchFamily="49" charset="0"/>
+            </a:endParaRPr>
           </a:p>
           <a:p>
             <a:endParaRPr lang="en-US" sz="2400" dirty="0">
@@ -10330,7 +10270,7 @@
               <a:pPr algn="ctr"/>
               <a:r>
                 <a:rPr lang="en-US" dirty="0" smtClean="0"/>
-                <a:t>Function Composition</a:t>
+                <a:t>Combine simpler functions</a:t>
               </a:r>
               <a:endParaRPr lang="en-US" dirty="0"/>
             </a:p>
@@ -10344,7 +10284,7 @@
           </p:nvSpPr>
           <p:spPr>
             <a:xfrm>
-              <a:off x="2598691" y="2566044"/>
+              <a:off x="2598691" y="2766140"/>
               <a:ext cx="1828800" cy="533400"/>
             </a:xfrm>
             <a:prstGeom prst="roundRect">
@@ -10374,7 +10314,7 @@
               <a:pPr algn="ctr"/>
               <a:r>
                 <a:rPr lang="en-US" dirty="0" smtClean="0"/>
-                <a:t>Structural Decomposition</a:t>
+                <a:t>Use a template</a:t>
               </a:r>
               <a:endParaRPr lang="en-US" dirty="0"/>
             </a:p>
@@ -10422,7 +10362,7 @@
               <a:pPr algn="ctr"/>
               <a:r>
                 <a:rPr lang="en-US" dirty="0" smtClean="0"/>
-                <a:t>Generalization</a:t>
+                <a:t>Divide into Cases</a:t>
               </a:r>
               <a:endParaRPr lang="en-US" dirty="0"/>
             </a:p>
@@ -10470,7 +10410,7 @@
               <a:pPr algn="ctr"/>
               <a:r>
                 <a:rPr lang="en-US" dirty="0" smtClean="0"/>
-                <a:t>General Recursion</a:t>
+                <a:t>Call a more general function</a:t>
               </a:r>
               <a:endParaRPr lang="en-US" dirty="0"/>
             </a:p>
@@ -10518,7 +10458,7 @@
               <a:pPr algn="ctr"/>
               <a:r>
                 <a:rPr lang="en-US" dirty="0" smtClean="0"/>
-                <a:t>Communication via State</a:t>
+                <a:t>Communicate via State</a:t>
               </a:r>
               <a:endParaRPr lang="en-US" dirty="0"/>
             </a:p>
@@ -10536,7 +10476,7 @@
           <p:spPr>
             <a:xfrm>
               <a:off x="3513091" y="2291187"/>
-              <a:ext cx="0" cy="274857"/>
+              <a:ext cx="0" cy="474953"/>
             </a:xfrm>
             <a:prstGeom prst="straightConnector1">
               <a:avLst/>
@@ -10571,8 +10511,8 @@
           </p:nvCxnSpPr>
           <p:spPr>
             <a:xfrm>
-              <a:off x="3513091" y="3099444"/>
-              <a:ext cx="0" cy="675049"/>
+              <a:off x="3513091" y="3299540"/>
+              <a:ext cx="0" cy="474953"/>
             </a:xfrm>
             <a:prstGeom prst="straightConnector1">
               <a:avLst/>
@@ -11018,7 +10958,7 @@
         <p:nvCxnSpPr>
           <p:cNvPr id="113" name="Elbow Connector 112"/>
           <p:cNvCxnSpPr>
-            <a:stCxn id="28" idx="3"/>
+            <a:stCxn id="38" idx="3"/>
             <a:endCxn id="7" idx="1"/>
           </p:cNvCxnSpPr>
           <p:nvPr/>
@@ -11026,7 +10966,7 @@
         <p:spPr>
           <a:xfrm flipV="1">
             <a:off x="5486400" y="2024487"/>
-            <a:ext cx="914400" cy="2016706"/>
+            <a:ext cx="914400" cy="3025059"/>
           </a:xfrm>
           <a:prstGeom prst="bentConnector3">
             <a:avLst>
@@ -11052,10 +10992,33 @@
           </a:fontRef>
         </p:style>
       </p:cxnSp>
+      <p:sp>
+        <p:nvSpPr>
+          <p:cNvPr id="2" name="Slide Number Placeholder 1"/>
+          <p:cNvSpPr>
+            <a:spLocks noGrp="1"/>
+          </p:cNvSpPr>
+          <p:nvPr>
+            <p:ph type="sldNum" sz="quarter" idx="12"/>
+          </p:nvPr>
+        </p:nvSpPr>
+        <p:spPr/>
+        <p:txBody>
+          <a:bodyPr/>
+          <a:lstStyle/>
+          <a:p>
+            <a:fld id="{2AF3B5EA-18B6-4040-9F78-6052AF49C681}" type="slidenum">
+              <a:rPr lang="en-US" smtClean="0"/>
+              <a:t>3</a:t>
+            </a:fld>
+            <a:endParaRPr lang="en-US"/>
+          </a:p>
+        </p:txBody>
+      </p:sp>
     </p:spTree>
     <p:extLst>
       <p:ext uri="{BB962C8B-B14F-4D97-AF65-F5344CB8AC3E}">
-        <p14:creationId xmlns:p14="http://schemas.microsoft.com/office/powerpoint/2010/main" val="2933289503"/>
+        <p14:creationId xmlns:p14="http://schemas.microsoft.com/office/powerpoint/2010/main" val="4205652346"/>
       </p:ext>
     </p:extLst>
   </p:cSld>
@@ -11265,8 +11228,19 @@
                 <a:latin typeface="Consolas" pitchFamily="49" charset="0"/>
                 <a:cs typeface="Consolas" pitchFamily="49" charset="0"/>
               </a:rPr>
-              <a:t>;; STRATEGY: structural decomposition on w : World</a:t>
-            </a:r>
+              <a:t>;; STRATEGY: </a:t>
+            </a:r>
+            <a:r>
+              <a:rPr lang="en-US" sz="2000" b="1" dirty="0" smtClean="0">
+                <a:latin typeface="Consolas" pitchFamily="49" charset="0"/>
+                <a:cs typeface="Consolas" pitchFamily="49" charset="0"/>
+              </a:rPr>
+              <a:t>Use template for World on w</a:t>
+            </a:r>
+            <a:endParaRPr lang="en-US" sz="2000" b="1" dirty="0">
+              <a:latin typeface="Consolas" pitchFamily="49" charset="0"/>
+              <a:cs typeface="Consolas" pitchFamily="49" charset="0"/>
+            </a:endParaRPr>
           </a:p>
           <a:p>
             <a:pPr>
@@ -11615,8 +11589,19 @@
                 <a:latin typeface="Consolas" pitchFamily="49" charset="0"/>
                 <a:cs typeface="Consolas" pitchFamily="49" charset="0"/>
               </a:rPr>
-              <a:t>;; STRATEGY: structural decomposition on w : World</a:t>
-            </a:r>
+              <a:t>;; STRATEGY: </a:t>
+            </a:r>
+            <a:r>
+              <a:rPr lang="en-US" sz="2000" b="1" dirty="0" smtClean="0">
+                <a:latin typeface="Consolas" pitchFamily="49" charset="0"/>
+                <a:cs typeface="Consolas" pitchFamily="49" charset="0"/>
+              </a:rPr>
+              <a:t>use template for World on w</a:t>
+            </a:r>
+            <a:endParaRPr lang="en-US" sz="2000" b="1" dirty="0">
+              <a:latin typeface="Consolas" pitchFamily="49" charset="0"/>
+              <a:cs typeface="Consolas" pitchFamily="49" charset="0"/>
+            </a:endParaRPr>
           </a:p>
           <a:p>
             <a:r>
@@ -13231,7 +13216,14 @@
                 <a:latin typeface="Consolas" pitchFamily="49" charset="0"/>
                 <a:cs typeface="Consolas" pitchFamily="49" charset="0"/>
               </a:rPr>
-              <a:t>;; STRATEGY: function composition</a:t>
+              <a:t>;; STRATEGY: </a:t>
+            </a:r>
+            <a:r>
+              <a:rPr lang="en-US" sz="2000" b="1" dirty="0" smtClean="0">
+                <a:latin typeface="Consolas" pitchFamily="49" charset="0"/>
+                <a:cs typeface="Consolas" pitchFamily="49" charset="0"/>
+              </a:rPr>
+              <a:t>Combine simpler functions</a:t>
             </a:r>
             <a:endParaRPr lang="en-US" sz="2000" b="1" dirty="0">
               <a:latin typeface="Consolas" pitchFamily="49" charset="0"/>
@@ -13334,8 +13326,8 @@
         </p:nvSpPr>
         <p:spPr>
           <a:xfrm>
-            <a:off x="6373090" y="3302669"/>
-            <a:ext cx="2770909" cy="923330"/>
+            <a:off x="6373091" y="3029727"/>
+            <a:ext cx="2770909" cy="1200329"/>
           </a:xfrm>
           <a:prstGeom prst="rect">
             <a:avLst/>
@@ -13368,12 +13360,8 @@
           <a:lstStyle/>
           <a:p>
             <a:r>
-              <a:rPr lang="en-US" b="1" dirty="0" smtClean="0"/>
-              <a:t>main</a:t>
-            </a:r>
-            <a:r>
-              <a:rPr lang="en-US" dirty="0" smtClean="0"/>
-              <a:t> just calls </a:t>
+              <a:rPr lang="en-US" dirty="0" smtClean="0"/>
+              <a:t>Here the simpler functions are </a:t>
             </a:r>
             <a:r>
               <a:rPr lang="en-US" b="1" dirty="0" smtClean="0"/>
@@ -13381,9 +13369,29 @@
             </a:r>
             <a:r>
               <a:rPr lang="en-US" dirty="0" smtClean="0"/>
-              <a:t>, so the strategy is function composition.</a:t>
-            </a:r>
-            <a:endParaRPr lang="en-US" dirty="0"/>
+              <a:t>, </a:t>
+            </a:r>
+            <a:r>
+              <a:rPr lang="en-US" b="1" dirty="0" smtClean="0"/>
+              <a:t>world-after-tick</a:t>
+            </a:r>
+            <a:r>
+              <a:rPr lang="en-US" dirty="0" smtClean="0"/>
+              <a:t>, </a:t>
+            </a:r>
+            <a:r>
+              <a:rPr lang="en-US" b="1" dirty="0" smtClean="0"/>
+              <a:t>world-after-key-event</a:t>
+            </a:r>
+            <a:r>
+              <a:rPr lang="en-US" dirty="0" smtClean="0"/>
+              <a:t>, and </a:t>
+            </a:r>
+            <a:r>
+              <a:rPr lang="en-US" b="1" dirty="0" smtClean="0"/>
+              <a:t>world-to-scene</a:t>
+            </a:r>
+            <a:endParaRPr lang="en-US" b="1" dirty="0"/>
           </a:p>
         </p:txBody>
       </p:sp>
@@ -13396,9 +13404,9 @@
           <p:nvPr/>
         </p:nvCxnSpPr>
         <p:spPr>
-          <a:xfrm flipH="1" flipV="1">
-            <a:off x="5237018" y="3629891"/>
-            <a:ext cx="1136072" cy="134443"/>
+          <a:xfrm flipH="1">
+            <a:off x="5923280" y="3629892"/>
+            <a:ext cx="449811" cy="0"/>
           </a:xfrm>
           <a:prstGeom prst="straightConnector1">
             <a:avLst/>

</xml_diff>

<commit_message>
added M05, working on M06
</commit_message>
<xml_diff>
--- a/Slides/Lesson 3.1 Introduction to Universe Programs.pptx
+++ b/Slides/Lesson 3.1 Introduction to Universe Programs.pptx
@@ -260,7 +260,7 @@
             <a:fld id="{CF8F25F6-E1EF-4065-8525-42EDEBD9BD22}" type="datetimeFigureOut">
               <a:rPr lang="en-US" smtClean="0"/>
               <a:pPr/>
-              <a:t>8/19/2015</a:t>
+              <a:t>8/20/2015</a:t>
             </a:fld>
             <a:endParaRPr lang="en-US"/>
           </a:p>
@@ -1263,7 +1263,7 @@
           <a:p>
             <a:fld id="{A63C2178-8CCA-4041-9770-46941EE52DB5}" type="datetime1">
               <a:rPr lang="en-US" smtClean="0"/>
-              <a:t>8/19/2015</a:t>
+              <a:t>8/20/2015</a:t>
             </a:fld>
             <a:endParaRPr lang="en-US"/>
           </a:p>
@@ -1365,7 +1365,7 @@
           <a:p>
             <a:fld id="{0C161806-E715-468D-BE16-87701E4DEEBC}" type="datetime1">
               <a:rPr lang="en-US" smtClean="0"/>
-              <a:t>8/19/2015</a:t>
+              <a:t>8/20/2015</a:t>
             </a:fld>
             <a:endParaRPr lang="en-US"/>
           </a:p>
@@ -1642,7 +1642,7 @@
           <a:p>
             <a:fld id="{A9D8D303-42C4-427F-ABF7-AEFFFE32ED17}" type="datetime1">
               <a:rPr lang="en-US" smtClean="0"/>
-              <a:t>8/19/2015</a:t>
+              <a:t>8/20/2015</a:t>
             </a:fld>
             <a:endParaRPr lang="en-US"/>
           </a:p>
@@ -1895,7 +1895,7 @@
           <a:p>
             <a:fld id="{8881F7A1-287F-44F2-B7D9-DD795EA52044}" type="datetime1">
               <a:rPr lang="en-US" smtClean="0"/>
-              <a:t>8/19/2015</a:t>
+              <a:t>8/20/2015</a:t>
             </a:fld>
             <a:endParaRPr lang="en-US"/>
           </a:p>
@@ -2065,7 +2065,7 @@
           <a:p>
             <a:fld id="{83474B67-F4E7-4DFB-B423-D87208E8E4B0}" type="datetime1">
               <a:rPr lang="en-US" smtClean="0"/>
-              <a:t>8/19/2015</a:t>
+              <a:t>8/20/2015</a:t>
             </a:fld>
             <a:endParaRPr lang="en-US"/>
           </a:p>
@@ -2245,7 +2245,7 @@
           <a:p>
             <a:fld id="{F60F46CE-91A9-441B-A2C8-FCB5990C0EDE}" type="datetime1">
               <a:rPr lang="en-US" smtClean="0"/>
-              <a:t>8/19/2015</a:t>
+              <a:t>8/20/2015</a:t>
             </a:fld>
             <a:endParaRPr lang="en-US"/>
           </a:p>
@@ -2421,7 +2421,7 @@
           <a:p>
             <a:fld id="{B3DFFEBE-01B4-41A8-9B95-B3B902B856D2}" type="datetime1">
               <a:rPr lang="en-US" smtClean="0"/>
-              <a:t>8/19/2015</a:t>
+              <a:t>8/20/2015</a:t>
             </a:fld>
             <a:endParaRPr lang="en-US"/>
           </a:p>
@@ -2603,7 +2603,7 @@
           <a:p>
             <a:fld id="{2A6D6241-06C8-44C3-8021-44489836A6EB}" type="datetime1">
               <a:rPr lang="en-US" smtClean="0"/>
-              <a:t>8/19/2015</a:t>
+              <a:t>8/20/2015</a:t>
             </a:fld>
             <a:endParaRPr lang="en-US"/>
           </a:p>
@@ -2875,7 +2875,7 @@
           <a:p>
             <a:fld id="{CD473BB5-DF40-4CF2-8CE7-6D226E43FF1C}" type="datetime1">
               <a:rPr lang="en-US" smtClean="0"/>
-              <a:t>8/19/2015</a:t>
+              <a:t>8/20/2015</a:t>
             </a:fld>
             <a:endParaRPr lang="en-US"/>
           </a:p>
@@ -3060,7 +3060,7 @@
           <a:p>
             <a:fld id="{F70727AD-60D7-4449-BD5C-671E0F9D77F5}" type="datetime1">
               <a:rPr lang="en-US" smtClean="0"/>
-              <a:t>8/19/2015</a:t>
+              <a:t>8/20/2015</a:t>
             </a:fld>
             <a:endParaRPr lang="en-US"/>
           </a:p>
@@ -3362,7 +3362,7 @@
           <a:p>
             <a:fld id="{D3E92E5D-74F7-4353-A80A-F4D05623AC96}" type="datetime1">
               <a:rPr lang="en-US" smtClean="0"/>
-              <a:t>8/19/2015</a:t>
+              <a:t>8/20/2015</a:t>
             </a:fld>
             <a:endParaRPr lang="en-US"/>
           </a:p>
@@ -3650,7 +3650,7 @@
           <a:p>
             <a:fld id="{6543AFF9-3E5C-4F69-80D4-8BC6FD57BFEF}" type="datetime1">
               <a:rPr lang="en-US" smtClean="0"/>
-              <a:t>8/19/2015</a:t>
+              <a:t>8/20/2015</a:t>
             </a:fld>
             <a:endParaRPr lang="en-US"/>
           </a:p>
@@ -4072,7 +4072,7 @@
           <a:p>
             <a:fld id="{806389F3-E267-4166-96D5-E1B928433BFE}" type="datetime1">
               <a:rPr lang="en-US" smtClean="0"/>
-              <a:t>8/19/2015</a:t>
+              <a:t>8/20/2015</a:t>
             </a:fld>
             <a:endParaRPr lang="en-US"/>
           </a:p>
@@ -4190,7 +4190,7 @@
           <a:p>
             <a:fld id="{1FD6636A-1E59-4641-9B3B-6A1B810E8AEE}" type="datetime1">
               <a:rPr lang="en-US" smtClean="0"/>
-              <a:t>8/19/2015</a:t>
+              <a:t>8/20/2015</a:t>
             </a:fld>
             <a:endParaRPr lang="en-US"/>
           </a:p>
@@ -4422,7 +4422,7 @@
           <a:p>
             <a:fld id="{925A3613-5E0B-4B6E-BE51-1FA4AA29D085}" type="datetime1">
               <a:rPr lang="en-US" smtClean="0"/>
-              <a:t>8/19/2015</a:t>
+              <a:t>8/20/2015</a:t>
             </a:fld>
             <a:endParaRPr lang="en-US"/>
           </a:p>
@@ -7978,21 +7978,8 @@
                   <a:schemeClr val="tx1"/>
                 </a:solidFill>
               </a:rPr>
-              <a:t>Here we’ve just written out the function because it was so </a:t>
-            </a:r>
-            <a:r>
-              <a:rPr lang="en-US" dirty="0" smtClean="0">
-                <a:solidFill>
-                  <a:schemeClr val="tx1"/>
-                </a:solidFill>
-              </a:rPr>
-              <a:t>simple.  If it were any more complicated, we might break it up into pieces, as on the next slide.</a:t>
-            </a:r>
-            <a:endParaRPr lang="en-US" dirty="0" smtClean="0">
-              <a:solidFill>
-                <a:schemeClr val="tx1"/>
-              </a:solidFill>
-            </a:endParaRPr>
+              <a:t>Here we’ve just written out the function because it was so simple.  If it were any more complicated, we might break it up into pieces, as on the next slide.</a:t>
+            </a:r>
           </a:p>
         </p:txBody>
       </p:sp>
@@ -8083,11 +8070,6 @@
               </a:rPr>
               <a:t>You don’t have to be so detailed.  </a:t>
             </a:r>
-            <a:endParaRPr lang="en-US" dirty="0" smtClean="0">
-              <a:solidFill>
-                <a:schemeClr val="tx1"/>
-              </a:solidFill>
-            </a:endParaRPr>
           </a:p>
         </p:txBody>
       </p:sp>
@@ -8340,11 +8322,6 @@
               </a:rPr>
               <a:t>Here we’ve broken the definition into pieces.  If either of the pieces is complicated, this would be better code than what we saw on the preceding slide.</a:t>
             </a:r>
-            <a:endParaRPr lang="en-US" dirty="0" smtClean="0">
-              <a:solidFill>
-                <a:schemeClr val="tx1"/>
-              </a:solidFill>
-            </a:endParaRPr>
           </a:p>
         </p:txBody>
       </p:sp>
@@ -9517,10 +9494,6 @@
               </a:rPr>
               <a:t>;; for world-after-key-event, we have 4 </a:t>
             </a:r>
-            <a:endParaRPr lang="en-US" sz="2400" b="1" dirty="0" smtClean="0">
-              <a:latin typeface="Consolas" pitchFamily="49" charset="0"/>
-              <a:cs typeface="Consolas" pitchFamily="49" charset="0"/>
-            </a:endParaRPr>
           </a:p>
           <a:p>
             <a:pPr>
@@ -9534,21 +9507,7 @@
                 <a:latin typeface="Consolas" pitchFamily="49" charset="0"/>
                 <a:cs typeface="Consolas" pitchFamily="49" charset="0"/>
               </a:rPr>
-              <a:t>;; </a:t>
-            </a:r>
-            <a:r>
-              <a:rPr lang="en-US" sz="2400" b="1" dirty="0" smtClean="0">
-                <a:latin typeface="Consolas" pitchFamily="49" charset="0"/>
-                <a:cs typeface="Consolas" pitchFamily="49" charset="0"/>
-              </a:rPr>
-              <a:t>equivalence </a:t>
-            </a:r>
-            <a:r>
-              <a:rPr lang="en-US" sz="2400" b="1" dirty="0" smtClean="0">
-                <a:latin typeface="Consolas" pitchFamily="49" charset="0"/>
-                <a:cs typeface="Consolas" pitchFamily="49" charset="0"/>
-              </a:rPr>
-              <a:t>classes: all combinations of: </a:t>
+              <a:t>;; equivalence classes: all combinations of: </a:t>
             </a:r>
           </a:p>
           <a:p>
@@ -9592,14 +9551,7 @@
                 <a:latin typeface="Consolas" pitchFamily="49" charset="0"/>
                 <a:cs typeface="Consolas" pitchFamily="49" charset="0"/>
               </a:rPr>
-              <a:t>;; and a "pause" key event and a "non-pause" </a:t>
-            </a:r>
-            <a:r>
-              <a:rPr lang="en-US" sz="2400" b="1" dirty="0" smtClean="0">
-                <a:latin typeface="Consolas" pitchFamily="49" charset="0"/>
-                <a:cs typeface="Consolas" pitchFamily="49" charset="0"/>
-              </a:rPr>
-              <a:t>key</a:t>
+              <a:t>;; and a "pause" key event and a "non-pause" key</a:t>
             </a:r>
           </a:p>
           <a:p>
@@ -9614,21 +9566,7 @@
                 <a:latin typeface="Consolas" pitchFamily="49" charset="0"/>
                 <a:cs typeface="Consolas" pitchFamily="49" charset="0"/>
               </a:rPr>
-              <a:t>;;</a:t>
-            </a:r>
-            <a:r>
-              <a:rPr lang="en-US" sz="2400" b="1" dirty="0" smtClean="0">
-                <a:latin typeface="Consolas" pitchFamily="49" charset="0"/>
-                <a:cs typeface="Consolas" pitchFamily="49" charset="0"/>
-              </a:rPr>
-              <a:t> </a:t>
-            </a:r>
-            <a:r>
-              <a:rPr lang="en-US" sz="2400" b="1" dirty="0" smtClean="0">
-                <a:latin typeface="Consolas" pitchFamily="49" charset="0"/>
-                <a:cs typeface="Consolas" pitchFamily="49" charset="0"/>
-              </a:rPr>
-              <a:t>event</a:t>
+              <a:t>;; event</a:t>
             </a:r>
           </a:p>
           <a:p>
@@ -13033,14 +12971,7 @@
                 <a:latin typeface="Consolas" pitchFamily="49" charset="0"/>
                 <a:cs typeface="Consolas" pitchFamily="49" charset="0"/>
               </a:rPr>
-              <a:t>use template for World on </a:t>
-            </a:r>
-            <a:r>
-              <a:rPr lang="en-US" sz="2000" b="1" dirty="0" smtClean="0">
-                <a:latin typeface="Consolas" pitchFamily="49" charset="0"/>
-                <a:cs typeface="Consolas" pitchFamily="49" charset="0"/>
-              </a:rPr>
-              <a:t>w</a:t>
+              <a:t>use template for World on w</a:t>
             </a:r>
           </a:p>
           <a:p>
@@ -13182,11 +13113,7 @@
             </a:r>
             <a:r>
               <a:rPr lang="en-US" dirty="0" smtClean="0"/>
-              <a:t>.  That's ok– </a:t>
-            </a:r>
-            <a:r>
-              <a:rPr lang="en-US" dirty="0" smtClean="0"/>
-              <a:t>the template tells us what we </a:t>
+              <a:t>.  That's ok– the template tells us what we </a:t>
             </a:r>
             <a:r>
               <a:rPr lang="en-US" i="1" dirty="0" smtClean="0"/>
@@ -15136,11 +15063,7 @@
             </a:r>
             <a:r>
               <a:rPr lang="en-US" dirty="0" smtClean="0"/>
-              <a:t>, which are scalars (no template needed), and we take them apart using the "Cases" strategy</a:t>
-            </a:r>
-            <a:r>
-              <a:rPr lang="en-US" dirty="0" smtClean="0"/>
-              <a:t>.</a:t>
+              <a:t>, which are scalars (no template needed), and we take them apart using the "Cases" strategy.</a:t>
             </a:r>
           </a:p>
           <a:p>
@@ -15736,11 +15659,7 @@
                       <a:pPr algn="ctr"/>
                       <a:r>
                         <a:rPr lang="en-US" sz="1200" dirty="0" smtClean="0"/>
-                        <a:t>The Six Principles </a:t>
-                      </a:r>
-                      <a:r>
-                        <a:rPr lang="en-US" sz="1200" dirty="0" smtClean="0"/>
-                        <a:t>for</a:t>
+                        <a:t>The Six Principles for</a:t>
                       </a:r>
                       <a:r>
                         <a:rPr lang="en-US" sz="1200" baseline="0" dirty="0" smtClean="0"/>

</xml_diff>

<commit_message>
added advice re check-location to ps02.html
</commit_message>
<xml_diff>
--- a/Slides/Lesson 3.1 Introduction to Universe Programs.pptx
+++ b/Slides/Lesson 3.1 Introduction to Universe Programs.pptx
@@ -260,7 +260,7 @@
             <a:fld id="{CF8F25F6-E1EF-4065-8525-42EDEBD9BD22}" type="datetimeFigureOut">
               <a:rPr lang="en-US" smtClean="0"/>
               <a:pPr/>
-              <a:t>8/20/2015</a:t>
+              <a:t>9/19/2015</a:t>
             </a:fld>
             <a:endParaRPr lang="en-US"/>
           </a:p>
@@ -1263,7 +1263,7 @@
           <a:p>
             <a:fld id="{A63C2178-8CCA-4041-9770-46941EE52DB5}" type="datetime1">
               <a:rPr lang="en-US" smtClean="0"/>
-              <a:t>8/20/2015</a:t>
+              <a:t>9/19/2015</a:t>
             </a:fld>
             <a:endParaRPr lang="en-US"/>
           </a:p>
@@ -1365,7 +1365,7 @@
           <a:p>
             <a:fld id="{0C161806-E715-468D-BE16-87701E4DEEBC}" type="datetime1">
               <a:rPr lang="en-US" smtClean="0"/>
-              <a:t>8/20/2015</a:t>
+              <a:t>9/19/2015</a:t>
             </a:fld>
             <a:endParaRPr lang="en-US"/>
           </a:p>
@@ -1642,7 +1642,7 @@
           <a:p>
             <a:fld id="{A9D8D303-42C4-427F-ABF7-AEFFFE32ED17}" type="datetime1">
               <a:rPr lang="en-US" smtClean="0"/>
-              <a:t>8/20/2015</a:t>
+              <a:t>9/19/2015</a:t>
             </a:fld>
             <a:endParaRPr lang="en-US"/>
           </a:p>
@@ -1895,7 +1895,7 @@
           <a:p>
             <a:fld id="{8881F7A1-287F-44F2-B7D9-DD795EA52044}" type="datetime1">
               <a:rPr lang="en-US" smtClean="0"/>
-              <a:t>8/20/2015</a:t>
+              <a:t>9/19/2015</a:t>
             </a:fld>
             <a:endParaRPr lang="en-US"/>
           </a:p>
@@ -2065,7 +2065,7 @@
           <a:p>
             <a:fld id="{83474B67-F4E7-4DFB-B423-D87208E8E4B0}" type="datetime1">
               <a:rPr lang="en-US" smtClean="0"/>
-              <a:t>8/20/2015</a:t>
+              <a:t>9/19/2015</a:t>
             </a:fld>
             <a:endParaRPr lang="en-US"/>
           </a:p>
@@ -2245,7 +2245,7 @@
           <a:p>
             <a:fld id="{F60F46CE-91A9-441B-A2C8-FCB5990C0EDE}" type="datetime1">
               <a:rPr lang="en-US" smtClean="0"/>
-              <a:t>8/20/2015</a:t>
+              <a:t>9/19/2015</a:t>
             </a:fld>
             <a:endParaRPr lang="en-US"/>
           </a:p>
@@ -2421,7 +2421,7 @@
           <a:p>
             <a:fld id="{B3DFFEBE-01B4-41A8-9B95-B3B902B856D2}" type="datetime1">
               <a:rPr lang="en-US" smtClean="0"/>
-              <a:t>8/20/2015</a:t>
+              <a:t>9/19/2015</a:t>
             </a:fld>
             <a:endParaRPr lang="en-US"/>
           </a:p>
@@ -2603,7 +2603,7 @@
           <a:p>
             <a:fld id="{2A6D6241-06C8-44C3-8021-44489836A6EB}" type="datetime1">
               <a:rPr lang="en-US" smtClean="0"/>
-              <a:t>8/20/2015</a:t>
+              <a:t>9/19/2015</a:t>
             </a:fld>
             <a:endParaRPr lang="en-US"/>
           </a:p>
@@ -2875,7 +2875,7 @@
           <a:p>
             <a:fld id="{CD473BB5-DF40-4CF2-8CE7-6D226E43FF1C}" type="datetime1">
               <a:rPr lang="en-US" smtClean="0"/>
-              <a:t>8/20/2015</a:t>
+              <a:t>9/19/2015</a:t>
             </a:fld>
             <a:endParaRPr lang="en-US"/>
           </a:p>
@@ -3060,7 +3060,7 @@
           <a:p>
             <a:fld id="{F70727AD-60D7-4449-BD5C-671E0F9D77F5}" type="datetime1">
               <a:rPr lang="en-US" smtClean="0"/>
-              <a:t>8/20/2015</a:t>
+              <a:t>9/19/2015</a:t>
             </a:fld>
             <a:endParaRPr lang="en-US"/>
           </a:p>
@@ -3362,7 +3362,7 @@
           <a:p>
             <a:fld id="{D3E92E5D-74F7-4353-A80A-F4D05623AC96}" type="datetime1">
               <a:rPr lang="en-US" smtClean="0"/>
-              <a:t>8/20/2015</a:t>
+              <a:t>9/19/2015</a:t>
             </a:fld>
             <a:endParaRPr lang="en-US"/>
           </a:p>
@@ -3650,7 +3650,7 @@
           <a:p>
             <a:fld id="{6543AFF9-3E5C-4F69-80D4-8BC6FD57BFEF}" type="datetime1">
               <a:rPr lang="en-US" smtClean="0"/>
-              <a:t>8/20/2015</a:t>
+              <a:t>9/19/2015</a:t>
             </a:fld>
             <a:endParaRPr lang="en-US"/>
           </a:p>
@@ -4072,7 +4072,7 @@
           <a:p>
             <a:fld id="{806389F3-E267-4166-96D5-E1B928433BFE}" type="datetime1">
               <a:rPr lang="en-US" smtClean="0"/>
-              <a:t>8/20/2015</a:t>
+              <a:t>9/19/2015</a:t>
             </a:fld>
             <a:endParaRPr lang="en-US"/>
           </a:p>
@@ -4190,7 +4190,7 @@
           <a:p>
             <a:fld id="{1FD6636A-1E59-4641-9B3B-6A1B810E8AEE}" type="datetime1">
               <a:rPr lang="en-US" smtClean="0"/>
-              <a:t>8/20/2015</a:t>
+              <a:t>9/19/2015</a:t>
             </a:fld>
             <a:endParaRPr lang="en-US"/>
           </a:p>
@@ -4422,7 +4422,7 @@
           <a:p>
             <a:fld id="{925A3613-5E0B-4B6E-BE51-1FA4AA29D085}" type="datetime1">
               <a:rPr lang="en-US" smtClean="0"/>
-              <a:t>8/20/2015</a:t>
+              <a:t>9/19/2015</a:t>
             </a:fld>
             <a:endParaRPr lang="en-US"/>
           </a:p>

</xml_diff>